<commit_message>
[update] add camera permission
</commit_message>
<xml_diff>
--- a/ppt/8. 클래스.pptx
+++ b/ppt/8. 클래스.pptx
@@ -7,6 +7,9 @@
   <p:sldIdLst>
     <p:sldId id="256" r:id="rId2"/>
     <p:sldId id="257" r:id="rId3"/>
+    <p:sldId id="258" r:id="rId4"/>
+    <p:sldId id="260" r:id="rId5"/>
+    <p:sldId id="259" r:id="rId6"/>
   </p:sldIdLst>
   <p:sldSz cx="12192000" cy="6858000"/>
   <p:notesSz cx="6858000" cy="9144000"/>
@@ -4142,6 +4145,648 @@
 </p:sld>
 </file>
 
+<file path=ppt/slides/slide3.xml><?xml version="1.0" encoding="utf-8"?>
+<p:sld xmlns:a="http://schemas.openxmlformats.org/drawingml/2006/main" xmlns:r="http://schemas.openxmlformats.org/officeDocument/2006/relationships" xmlns:p="http://schemas.openxmlformats.org/presentationml/2006/main">
+  <p:cSld>
+    <p:spTree>
+      <p:nvGrpSpPr>
+        <p:cNvPr id="1" name=""/>
+        <p:cNvGrpSpPr/>
+        <p:nvPr/>
+      </p:nvGrpSpPr>
+      <p:grpSpPr>
+        <a:xfrm>
+          <a:off x="0" y="0"/>
+          <a:ext cx="0" cy="0"/>
+          <a:chOff x="0" y="0"/>
+          <a:chExt cx="0" cy="0"/>
+        </a:xfrm>
+      </p:grpSpPr>
+      <p:sp>
+        <p:nvSpPr>
+          <p:cNvPr id="2" name="제목 1">
+            <a:extLst>
+              <a:ext uri="{FF2B5EF4-FFF2-40B4-BE49-F238E27FC236}">
+                <a16:creationId xmlns:a16="http://schemas.microsoft.com/office/drawing/2014/main" id="{D0AEE55F-9CAD-0F41-B526-DA886498ABD8}"/>
+              </a:ext>
+            </a:extLst>
+          </p:cNvPr>
+          <p:cNvSpPr>
+            <a:spLocks noGrp="1"/>
+          </p:cNvSpPr>
+          <p:nvPr>
+            <p:ph type="title"/>
+          </p:nvPr>
+        </p:nvSpPr>
+        <p:spPr/>
+        <p:txBody>
+          <a:bodyPr/>
+          <a:lstStyle/>
+          <a:p>
+            <a:r>
+              <a:rPr kumimoji="1" lang="ko-Kore-KR" altLang="en-US" dirty="0"/>
+              <a:t>학습</a:t>
+            </a:r>
+            <a:r>
+              <a:rPr kumimoji="1" lang="ko-KR" altLang="en-US" dirty="0"/>
+              <a:t> 정리</a:t>
+            </a:r>
+            <a:endParaRPr kumimoji="1" lang="ko-Kore-KR" altLang="en-US" dirty="0"/>
+          </a:p>
+        </p:txBody>
+      </p:sp>
+      <p:sp>
+        <p:nvSpPr>
+          <p:cNvPr id="3" name="내용 개체 틀 2">
+            <a:extLst>
+              <a:ext uri="{FF2B5EF4-FFF2-40B4-BE49-F238E27FC236}">
+                <a16:creationId xmlns:a16="http://schemas.microsoft.com/office/drawing/2014/main" id="{8FDA4777-74EA-2D42-ADE0-69A5E158C27B}"/>
+              </a:ext>
+            </a:extLst>
+          </p:cNvPr>
+          <p:cNvSpPr>
+            <a:spLocks noGrp="1"/>
+          </p:cNvSpPr>
+          <p:nvPr>
+            <p:ph idx="1"/>
+          </p:nvPr>
+        </p:nvSpPr>
+        <p:spPr/>
+        <p:txBody>
+          <a:bodyPr>
+            <a:normAutofit fontScale="92500" lnSpcReduction="20000"/>
+          </a:bodyPr>
+          <a:lstStyle/>
+          <a:p>
+            <a:r>
+              <a:rPr lang="ko-KR" altLang="en-US" b="1" dirty="0"/>
+              <a:t>클래스 </a:t>
+            </a:r>
+            <a:r>
+              <a:rPr lang="en-US" altLang="ko-KR" b="1" dirty="0"/>
+              <a:t>(</a:t>
+            </a:r>
+            <a:r>
+              <a:rPr lang="en" altLang="ko-Kore-KR" b="1" dirty="0"/>
+              <a:t>Class)</a:t>
+            </a:r>
+            <a:r>
+              <a:rPr lang="en" altLang="ko-Kore-KR" dirty="0"/>
+              <a:t>:</a:t>
+            </a:r>
+          </a:p>
+          <a:p>
+            <a:pPr>
+              <a:buFont typeface="Arial" panose="020B0604020202020204" pitchFamily="34" charset="0"/>
+              <a:buChar char="•"/>
+            </a:pPr>
+            <a:r>
+              <a:rPr lang="ko-KR" altLang="en-US" dirty="0"/>
+              <a:t>클래스는 객체를 생성하기 위한 템플릿 또는 청사진입니다</a:t>
+            </a:r>
+            <a:r>
+              <a:rPr lang="en-US" altLang="ko-KR" dirty="0"/>
+              <a:t>.</a:t>
+            </a:r>
+          </a:p>
+          <a:p>
+            <a:pPr>
+              <a:buFont typeface="Arial" panose="020B0604020202020204" pitchFamily="34" charset="0"/>
+              <a:buChar char="•"/>
+            </a:pPr>
+            <a:r>
+              <a:rPr lang="ko-KR" altLang="en-US" dirty="0"/>
+              <a:t>클래스는 속성</a:t>
+            </a:r>
+            <a:r>
+              <a:rPr lang="en-US" altLang="ko-KR" dirty="0"/>
+              <a:t>(</a:t>
+            </a:r>
+            <a:r>
+              <a:rPr lang="ko-KR" altLang="en-US" dirty="0"/>
+              <a:t>데이터</a:t>
+            </a:r>
+            <a:r>
+              <a:rPr lang="en-US" altLang="ko-KR" dirty="0"/>
+              <a:t>)</a:t>
+            </a:r>
+            <a:r>
+              <a:rPr lang="ko-KR" altLang="en-US" dirty="0"/>
+              <a:t>과 메서드</a:t>
+            </a:r>
+            <a:r>
+              <a:rPr lang="en-US" altLang="ko-KR" dirty="0"/>
+              <a:t>(</a:t>
+            </a:r>
+            <a:r>
+              <a:rPr lang="ko-KR" altLang="en-US" dirty="0"/>
+              <a:t>기능</a:t>
+            </a:r>
+            <a:r>
+              <a:rPr lang="en-US" altLang="ko-KR" dirty="0"/>
+              <a:t>)</a:t>
+            </a:r>
+            <a:r>
+              <a:rPr lang="ko-KR" altLang="en-US" dirty="0" err="1"/>
+              <a:t>를</a:t>
+            </a:r>
+            <a:r>
+              <a:rPr lang="ko-KR" altLang="en-US" dirty="0"/>
+              <a:t> 정의합니다</a:t>
+            </a:r>
+            <a:r>
+              <a:rPr lang="en-US" altLang="ko-KR" dirty="0"/>
+              <a:t>.</a:t>
+            </a:r>
+          </a:p>
+          <a:p>
+            <a:pPr>
+              <a:buFont typeface="Arial" panose="020B0604020202020204" pitchFamily="34" charset="0"/>
+              <a:buChar char="•"/>
+            </a:pPr>
+            <a:r>
+              <a:rPr lang="ko-KR" altLang="en-US" dirty="0"/>
+              <a:t>예를 들어</a:t>
+            </a:r>
+            <a:r>
+              <a:rPr lang="en-US" altLang="ko-KR" dirty="0"/>
+              <a:t>, </a:t>
+            </a:r>
+            <a:r>
+              <a:rPr lang="ko-KR" altLang="en-US" dirty="0"/>
+              <a:t>자동차라는 클래스를 정의할 때</a:t>
+            </a:r>
+            <a:r>
+              <a:rPr lang="en-US" altLang="ko-KR" dirty="0"/>
+              <a:t>, </a:t>
+            </a:r>
+            <a:r>
+              <a:rPr lang="ko-KR" altLang="en-US" dirty="0"/>
+              <a:t>속성으로 색상</a:t>
+            </a:r>
+            <a:r>
+              <a:rPr lang="en-US" altLang="ko-KR" dirty="0"/>
+              <a:t>, </a:t>
+            </a:r>
+            <a:r>
+              <a:rPr lang="ko-KR" altLang="en-US" dirty="0"/>
+              <a:t>모델</a:t>
+            </a:r>
+            <a:r>
+              <a:rPr lang="en-US" altLang="ko-KR" dirty="0"/>
+              <a:t>, </a:t>
+            </a:r>
+            <a:r>
+              <a:rPr lang="ko-KR" altLang="en-US" dirty="0"/>
+              <a:t>속도 등을 가질 수 있고</a:t>
+            </a:r>
+            <a:r>
+              <a:rPr lang="en-US" altLang="ko-KR" dirty="0"/>
+              <a:t>, </a:t>
+            </a:r>
+            <a:r>
+              <a:rPr lang="ko-KR" altLang="en-US" dirty="0"/>
+              <a:t>메서드로 주행하다</a:t>
+            </a:r>
+            <a:r>
+              <a:rPr lang="en-US" altLang="ko-KR" dirty="0"/>
+              <a:t>, </a:t>
+            </a:r>
+            <a:r>
+              <a:rPr lang="ko-KR" altLang="en-US" dirty="0"/>
+              <a:t>정지하다 등의 기능을 정의할 수 있습니다</a:t>
+            </a:r>
+            <a:r>
+              <a:rPr lang="en-US" altLang="ko-KR" dirty="0"/>
+              <a:t>.</a:t>
+            </a:r>
+          </a:p>
+          <a:p>
+            <a:r>
+              <a:rPr lang="ko-KR" altLang="en-US" b="1" dirty="0"/>
+              <a:t>객체 </a:t>
+            </a:r>
+            <a:r>
+              <a:rPr lang="en-US" altLang="ko-KR" b="1" dirty="0"/>
+              <a:t>(</a:t>
+            </a:r>
+            <a:r>
+              <a:rPr lang="en" altLang="ko-Kore-KR" b="1" dirty="0"/>
+              <a:t>Object)</a:t>
+            </a:r>
+            <a:r>
+              <a:rPr lang="en" altLang="ko-Kore-KR" dirty="0"/>
+              <a:t>:</a:t>
+            </a:r>
+          </a:p>
+          <a:p>
+            <a:pPr>
+              <a:buFont typeface="Arial" panose="020B0604020202020204" pitchFamily="34" charset="0"/>
+              <a:buChar char="•"/>
+            </a:pPr>
+            <a:r>
+              <a:rPr lang="ko-KR" altLang="en-US" dirty="0"/>
+              <a:t>객체는 클래스의 인스턴스</a:t>
+            </a:r>
+            <a:r>
+              <a:rPr lang="en-US" altLang="ko-KR" dirty="0"/>
+              <a:t>(</a:t>
+            </a:r>
+            <a:r>
+              <a:rPr lang="ko-KR" altLang="en-US" dirty="0"/>
+              <a:t>실제 구현체</a:t>
+            </a:r>
+            <a:r>
+              <a:rPr lang="en-US" altLang="ko-KR" dirty="0"/>
+              <a:t>)</a:t>
+            </a:r>
+            <a:r>
+              <a:rPr lang="ko-KR" altLang="en-US" dirty="0"/>
+              <a:t>입니다</a:t>
+            </a:r>
+            <a:r>
+              <a:rPr lang="en-US" altLang="ko-KR" dirty="0"/>
+              <a:t>.</a:t>
+            </a:r>
+          </a:p>
+          <a:p>
+            <a:pPr>
+              <a:buFont typeface="Arial" panose="020B0604020202020204" pitchFamily="34" charset="0"/>
+              <a:buChar char="•"/>
+            </a:pPr>
+            <a:r>
+              <a:rPr lang="ko-KR" altLang="en-US" dirty="0"/>
+              <a:t>클래스를 기반으로 생성된 실제 데이터와 기능을 갖춘 개체입니다</a:t>
+            </a:r>
+            <a:r>
+              <a:rPr lang="en-US" altLang="ko-KR" dirty="0"/>
+              <a:t>.</a:t>
+            </a:r>
+          </a:p>
+          <a:p>
+            <a:pPr>
+              <a:buFont typeface="Arial" panose="020B0604020202020204" pitchFamily="34" charset="0"/>
+              <a:buChar char="•"/>
+            </a:pPr>
+            <a:r>
+              <a:rPr lang="ko-KR" altLang="en-US" dirty="0"/>
+              <a:t>예를 들어</a:t>
+            </a:r>
+            <a:r>
+              <a:rPr lang="en-US" altLang="ko-KR" dirty="0"/>
+              <a:t>, </a:t>
+            </a:r>
+            <a:r>
+              <a:rPr lang="ko-KR" altLang="en-US" dirty="0"/>
+              <a:t>자동차 클래스를 이용해 실제로 빨간색 스포츠카라는 객체를 만들 수 있습니다</a:t>
+            </a:r>
+            <a:r>
+              <a:rPr lang="en-US" altLang="ko-KR" dirty="0"/>
+              <a:t>.</a:t>
+            </a:r>
+          </a:p>
+          <a:p>
+            <a:endParaRPr kumimoji="1" lang="ko-Kore-KR" altLang="en-US" dirty="0"/>
+          </a:p>
+        </p:txBody>
+      </p:sp>
+    </p:spTree>
+    <p:extLst>
+      <p:ext uri="{BB962C8B-B14F-4D97-AF65-F5344CB8AC3E}">
+        <p14:creationId xmlns:p14="http://schemas.microsoft.com/office/powerpoint/2010/main" val="1438862477"/>
+      </p:ext>
+    </p:extLst>
+  </p:cSld>
+  <p:clrMapOvr>
+    <a:masterClrMapping/>
+  </p:clrMapOvr>
+</p:sld>
+</file>
+
+<file path=ppt/slides/slide4.xml><?xml version="1.0" encoding="utf-8"?>
+<p:sld xmlns:a="http://schemas.openxmlformats.org/drawingml/2006/main" xmlns:r="http://schemas.openxmlformats.org/officeDocument/2006/relationships" xmlns:p="http://schemas.openxmlformats.org/presentationml/2006/main">
+  <p:cSld>
+    <p:spTree>
+      <p:nvGrpSpPr>
+        <p:cNvPr id="1" name=""/>
+        <p:cNvGrpSpPr/>
+        <p:nvPr/>
+      </p:nvGrpSpPr>
+      <p:grpSpPr>
+        <a:xfrm>
+          <a:off x="0" y="0"/>
+          <a:ext cx="0" cy="0"/>
+          <a:chOff x="0" y="0"/>
+          <a:chExt cx="0" cy="0"/>
+        </a:xfrm>
+      </p:grpSpPr>
+      <p:sp>
+        <p:nvSpPr>
+          <p:cNvPr id="2" name="제목 1">
+            <a:extLst>
+              <a:ext uri="{FF2B5EF4-FFF2-40B4-BE49-F238E27FC236}">
+                <a16:creationId xmlns:a16="http://schemas.microsoft.com/office/drawing/2014/main" id="{A08E3F8B-FF7E-FA4F-B637-0B9C7C697992}"/>
+              </a:ext>
+            </a:extLst>
+          </p:cNvPr>
+          <p:cNvSpPr>
+            <a:spLocks noGrp="1"/>
+          </p:cNvSpPr>
+          <p:nvPr>
+            <p:ph type="title"/>
+          </p:nvPr>
+        </p:nvSpPr>
+        <p:spPr/>
+        <p:txBody>
+          <a:bodyPr/>
+          <a:lstStyle/>
+          <a:p>
+            <a:r>
+              <a:rPr kumimoji="1" lang="ko-KR" altLang="en-US" dirty="0" err="1"/>
+              <a:t>추상클래스</a:t>
+            </a:r>
+            <a:endParaRPr kumimoji="1" lang="ko-Kore-KR" altLang="en-US" dirty="0"/>
+          </a:p>
+        </p:txBody>
+      </p:sp>
+      <p:sp>
+        <p:nvSpPr>
+          <p:cNvPr id="3" name="내용 개체 틀 2">
+            <a:extLst>
+              <a:ext uri="{FF2B5EF4-FFF2-40B4-BE49-F238E27FC236}">
+                <a16:creationId xmlns:a16="http://schemas.microsoft.com/office/drawing/2014/main" id="{FCEAD82A-CA49-5D49-812C-29B5968BA7DD}"/>
+              </a:ext>
+            </a:extLst>
+          </p:cNvPr>
+          <p:cNvSpPr>
+            <a:spLocks noGrp="1"/>
+          </p:cNvSpPr>
+          <p:nvPr>
+            <p:ph idx="1"/>
+          </p:nvPr>
+        </p:nvSpPr>
+        <p:spPr/>
+        <p:txBody>
+          <a:bodyPr>
+            <a:normAutofit fontScale="92500" lnSpcReduction="20000"/>
+          </a:bodyPr>
+          <a:lstStyle/>
+          <a:p>
+            <a:r>
+              <a:rPr kumimoji="1" lang="ko-Kore-KR" altLang="en-US" dirty="0"/>
+              <a:t>추상</a:t>
+            </a:r>
+            <a:r>
+              <a:rPr kumimoji="1" lang="ko-KR" altLang="en-US" dirty="0"/>
+              <a:t> 메서드는 구현되지 않은 메서드를 말한다</a:t>
+            </a:r>
+            <a:r>
+              <a:rPr kumimoji="1" lang="en-US" altLang="ko-KR" dirty="0"/>
+              <a:t>.</a:t>
+            </a:r>
+          </a:p>
+          <a:p>
+            <a:r>
+              <a:rPr kumimoji="1" lang="ko-KR" altLang="en-US" dirty="0"/>
+              <a:t>추상 클래스는 추상 메서드를 가지고 있는 클래스를 의미한다</a:t>
+            </a:r>
+            <a:r>
+              <a:rPr kumimoji="1" lang="en-US" altLang="ko-KR" dirty="0"/>
+              <a:t>.</a:t>
+            </a:r>
+          </a:p>
+          <a:p>
+            <a:r>
+              <a:rPr kumimoji="1" lang="ko-KR" altLang="en-US" dirty="0"/>
+              <a:t>완벽하게 구현되어 있지 않은 클래스</a:t>
+            </a:r>
+            <a:endParaRPr kumimoji="1" lang="en-US" altLang="ko-KR" dirty="0"/>
+          </a:p>
+          <a:p>
+            <a:r>
+              <a:rPr kumimoji="1" lang="ko-KR" altLang="en-US" dirty="0"/>
+              <a:t>추상클래스만 가지고는 객체를 생성할 수 없다</a:t>
+            </a:r>
+            <a:r>
+              <a:rPr kumimoji="1" lang="en-US" altLang="ko-KR" dirty="0"/>
+              <a:t>.</a:t>
+            </a:r>
+          </a:p>
+          <a:p>
+            <a:r>
+              <a:rPr kumimoji="1" lang="ko-KR" altLang="en-US" dirty="0"/>
+              <a:t>상속 받은 클래스를 구현 후 사용한다</a:t>
+            </a:r>
+            <a:r>
+              <a:rPr kumimoji="1" lang="en-US" altLang="ko-KR" dirty="0"/>
+              <a:t>.</a:t>
+            </a:r>
+          </a:p>
+          <a:p>
+            <a:r>
+              <a:rPr kumimoji="1" lang="ko-Kore-KR" altLang="en-US" dirty="0"/>
+              <a:t>오버라이딩의</a:t>
+            </a:r>
+            <a:r>
+              <a:rPr kumimoji="1" lang="ko-KR" altLang="en-US" dirty="0"/>
+              <a:t> 강제성을 부여하기 위해 필요</a:t>
+            </a:r>
+            <a:endParaRPr kumimoji="1" lang="en-US" altLang="ko-KR" dirty="0"/>
+          </a:p>
+          <a:p>
+            <a:r>
+              <a:rPr kumimoji="1" lang="ko-KR" altLang="en-US" dirty="0"/>
+              <a:t>쉽게 생각하여 실제 현업에서 코드를 큰 틀에서의 설계는 내가 해놓고 다른 개발자에게 세부 구현 </a:t>
+            </a:r>
+            <a:r>
+              <a:rPr kumimoji="1" lang="ko-KR" altLang="en-US" dirty="0" err="1"/>
+              <a:t>로직을</a:t>
+            </a:r>
+            <a:r>
+              <a:rPr kumimoji="1" lang="ko-KR" altLang="en-US" dirty="0"/>
+              <a:t> 설계하게끔 강제할 때 사용</a:t>
+            </a:r>
+            <a:endParaRPr kumimoji="1" lang="en-US" altLang="ko-KR" dirty="0"/>
+          </a:p>
+          <a:p>
+            <a:r>
+              <a:rPr lang="ko-KR" altLang="en-US" dirty="0"/>
+              <a:t>공통적인 기능을 가지지만</a:t>
+            </a:r>
+            <a:r>
+              <a:rPr lang="en-US" altLang="ko-KR" dirty="0"/>
+              <a:t>, </a:t>
+            </a:r>
+            <a:r>
+              <a:rPr lang="ko-KR" altLang="en-US"/>
+              <a:t>일부 기능은 서브클래스에서 구체적으로 구현해야 하는 경우</a:t>
+            </a:r>
+            <a:endParaRPr kumimoji="1" lang="en-US" altLang="ko-KR" dirty="0"/>
+          </a:p>
+          <a:p>
+            <a:endParaRPr kumimoji="1" lang="ko-Kore-KR" altLang="en-US" dirty="0"/>
+          </a:p>
+        </p:txBody>
+      </p:sp>
+    </p:spTree>
+    <p:extLst>
+      <p:ext uri="{BB962C8B-B14F-4D97-AF65-F5344CB8AC3E}">
+        <p14:creationId xmlns:p14="http://schemas.microsoft.com/office/powerpoint/2010/main" val="2773333366"/>
+      </p:ext>
+    </p:extLst>
+  </p:cSld>
+  <p:clrMapOvr>
+    <a:masterClrMapping/>
+  </p:clrMapOvr>
+</p:sld>
+</file>
+
+<file path=ppt/slides/slide5.xml><?xml version="1.0" encoding="utf-8"?>
+<p:sld xmlns:a="http://schemas.openxmlformats.org/drawingml/2006/main" xmlns:r="http://schemas.openxmlformats.org/officeDocument/2006/relationships" xmlns:p="http://schemas.openxmlformats.org/presentationml/2006/main">
+  <p:cSld>
+    <p:spTree>
+      <p:nvGrpSpPr>
+        <p:cNvPr id="1" name=""/>
+        <p:cNvGrpSpPr/>
+        <p:nvPr/>
+      </p:nvGrpSpPr>
+      <p:grpSpPr>
+        <a:xfrm>
+          <a:off x="0" y="0"/>
+          <a:ext cx="0" cy="0"/>
+          <a:chOff x="0" y="0"/>
+          <a:chExt cx="0" cy="0"/>
+        </a:xfrm>
+      </p:grpSpPr>
+      <p:sp>
+        <p:nvSpPr>
+          <p:cNvPr id="2" name="제목 1">
+            <a:extLst>
+              <a:ext uri="{FF2B5EF4-FFF2-40B4-BE49-F238E27FC236}">
+                <a16:creationId xmlns:a16="http://schemas.microsoft.com/office/drawing/2014/main" id="{0F160652-394A-3347-AC9A-BD1C793962FC}"/>
+              </a:ext>
+            </a:extLst>
+          </p:cNvPr>
+          <p:cNvSpPr>
+            <a:spLocks noGrp="1"/>
+          </p:cNvSpPr>
+          <p:nvPr>
+            <p:ph type="title"/>
+          </p:nvPr>
+        </p:nvSpPr>
+        <p:spPr/>
+        <p:txBody>
+          <a:bodyPr/>
+          <a:lstStyle/>
+          <a:p>
+            <a:r>
+              <a:rPr kumimoji="1" lang="ko-KR" altLang="en-US" dirty="0"/>
+              <a:t>인터페이스</a:t>
+            </a:r>
+            <a:endParaRPr kumimoji="1" lang="ko-Kore-KR" altLang="en-US" dirty="0"/>
+          </a:p>
+        </p:txBody>
+      </p:sp>
+      <p:sp>
+        <p:nvSpPr>
+          <p:cNvPr id="3" name="내용 개체 틀 2">
+            <a:extLst>
+              <a:ext uri="{FF2B5EF4-FFF2-40B4-BE49-F238E27FC236}">
+                <a16:creationId xmlns:a16="http://schemas.microsoft.com/office/drawing/2014/main" id="{B920312A-B783-454B-9161-8767A5D423EB}"/>
+              </a:ext>
+            </a:extLst>
+          </p:cNvPr>
+          <p:cNvSpPr>
+            <a:spLocks noGrp="1"/>
+          </p:cNvSpPr>
+          <p:nvPr>
+            <p:ph idx="1"/>
+          </p:nvPr>
+        </p:nvSpPr>
+        <p:spPr/>
+        <p:txBody>
+          <a:bodyPr/>
+          <a:lstStyle/>
+          <a:p>
+            <a:r>
+              <a:rPr kumimoji="1" lang="en-US" altLang="ko-Kore-KR" dirty="0"/>
+              <a:t>Kotlin</a:t>
+            </a:r>
+            <a:r>
+              <a:rPr kumimoji="1" lang="ko-KR" altLang="en-US" dirty="0"/>
+              <a:t>은 </a:t>
+            </a:r>
+            <a:r>
+              <a:rPr kumimoji="1" lang="en-US" altLang="ko-KR" dirty="0"/>
+              <a:t>Java</a:t>
+            </a:r>
+            <a:r>
+              <a:rPr kumimoji="1" lang="ko-KR" altLang="en-US" dirty="0"/>
+              <a:t>와 마찬가지로 다중 상속을 지원하지 않는다</a:t>
+            </a:r>
+            <a:r>
+              <a:rPr kumimoji="1" lang="en-US" altLang="ko-KR" dirty="0"/>
+              <a:t>.</a:t>
+            </a:r>
+          </a:p>
+          <a:p>
+            <a:r>
+              <a:rPr kumimoji="1" lang="ko-KR" altLang="en-US" dirty="0"/>
+              <a:t>이 때문에 자기 타입의 변수나 </a:t>
+            </a:r>
+            <a:r>
+              <a:rPr kumimoji="1" lang="ko-KR" altLang="en-US" dirty="0" err="1"/>
+              <a:t>부모형</a:t>
+            </a:r>
+            <a:r>
+              <a:rPr kumimoji="1" lang="ko-KR" altLang="en-US" dirty="0"/>
+              <a:t> 타입의 변수에만 담을 수 있다</a:t>
+            </a:r>
+            <a:r>
+              <a:rPr kumimoji="1" lang="en-US" altLang="ko-KR" dirty="0"/>
+              <a:t>.</a:t>
+            </a:r>
+          </a:p>
+          <a:p>
+            <a:r>
+              <a:rPr kumimoji="1" lang="ko-Kore-KR" altLang="en-US" dirty="0"/>
+              <a:t>만약</a:t>
+            </a:r>
+            <a:r>
+              <a:rPr kumimoji="1" lang="ko-KR" altLang="en-US" dirty="0"/>
+              <a:t> 생성된 객체의 </a:t>
+            </a:r>
+            <a:r>
+              <a:rPr kumimoji="1" lang="ko-KR" altLang="en-US" dirty="0" err="1"/>
+              <a:t>주소값을</a:t>
+            </a:r>
+            <a:r>
+              <a:rPr kumimoji="1" lang="ko-KR" altLang="en-US" dirty="0"/>
+              <a:t> 다양한 타입에 변수에 담을 수 있도록 한다면 인터페이스를 활용한다</a:t>
+            </a:r>
+            <a:r>
+              <a:rPr kumimoji="1" lang="en-US" altLang="ko-KR" dirty="0"/>
+              <a:t>.</a:t>
+            </a:r>
+          </a:p>
+          <a:p>
+            <a:endParaRPr kumimoji="1" lang="ko-Kore-KR" altLang="en-US" dirty="0"/>
+          </a:p>
+        </p:txBody>
+      </p:sp>
+    </p:spTree>
+    <p:extLst>
+      <p:ext uri="{BB962C8B-B14F-4D97-AF65-F5344CB8AC3E}">
+        <p14:creationId xmlns:p14="http://schemas.microsoft.com/office/powerpoint/2010/main" val="2648782186"/>
+      </p:ext>
+    </p:extLst>
+  </p:cSld>
+  <p:clrMapOvr>
+    <a:masterClrMapping/>
+  </p:clrMapOvr>
+</p:sld>
+</file>
+
 <file path=ppt/theme/theme1.xml><?xml version="1.0" encoding="utf-8"?>
 <a:theme xmlns:a="http://schemas.openxmlformats.org/drawingml/2006/main" name="자르기">
   <a:themeElements>

</xml_diff>